<commit_message>
added adding histograms code
</commit_message>
<xml_diff>
--- a/Project/figures/discretization1.pptx
+++ b/Project/figures/discretization1.pptx
@@ -3004,13 +3004,7 @@
                       </a:solidFill>
                       <a:tailEnd type="triangle"/>
                     </a:ln>
-                    <a:effectLst>
-                      <a:outerShdw blurRad="50800" dist="38100" dir="5400000" algn="t" rotWithShape="0">
-                        <a:prstClr val="black">
-                          <a:alpha val="40000"/>
-                        </a:prstClr>
-                      </a:outerShdw>
-                    </a:effectLst>
+                    <a:effectLst/>
                   </p:spPr>
                   <p:style>
                     <a:lnRef idx="1">
@@ -3050,13 +3044,7 @@
                       </a:solidFill>
                       <a:tailEnd type="triangle"/>
                     </a:ln>
-                    <a:effectLst>
-                      <a:outerShdw blurRad="50800" dist="38100" dir="5400000" algn="t" rotWithShape="0">
-                        <a:prstClr val="black">
-                          <a:alpha val="40000"/>
-                        </a:prstClr>
-                      </a:outerShdw>
-                    </a:effectLst>
+                    <a:effectLst/>
                   </p:spPr>
                   <p:style>
                     <a:lnRef idx="1">
@@ -6071,6 +6059,126 @@
           </p:style>
         </p:cxnSp>
       </p:grpSp>
+      <p:cxnSp>
+        <p:nvCxnSpPr>
+          <p:cNvPr id="169" name="Straight Connector 168"/>
+          <p:cNvCxnSpPr/>
+          <p:nvPr/>
+        </p:nvCxnSpPr>
+        <p:spPr>
+          <a:xfrm>
+            <a:off x="7636428" y="1923166"/>
+            <a:ext cx="221115" cy="0"/>
+          </a:xfrm>
+          <a:prstGeom prst="line">
+            <a:avLst/>
+          </a:prstGeom>
+          <a:ln w="28575">
+            <a:solidFill>
+              <a:srgbClr val="FF0000"/>
+            </a:solidFill>
+          </a:ln>
+          <a:effectLst/>
+        </p:spPr>
+        <p:style>
+          <a:lnRef idx="1">
+            <a:schemeClr val="accent1"/>
+          </a:lnRef>
+          <a:fillRef idx="0">
+            <a:schemeClr val="accent1"/>
+          </a:fillRef>
+          <a:effectRef idx="0">
+            <a:schemeClr val="accent1"/>
+          </a:effectRef>
+          <a:fontRef idx="minor">
+            <a:schemeClr val="tx1"/>
+          </a:fontRef>
+        </p:style>
+      </p:cxnSp>
+      <p:cxnSp>
+        <p:nvCxnSpPr>
+          <p:cNvPr id="171" name="Straight Connector 170"/>
+          <p:cNvCxnSpPr/>
+          <p:nvPr/>
+        </p:nvCxnSpPr>
+        <p:spPr>
+          <a:xfrm>
+            <a:off x="7636428" y="2248736"/>
+            <a:ext cx="226666" cy="0"/>
+          </a:xfrm>
+          <a:prstGeom prst="line">
+            <a:avLst/>
+          </a:prstGeom>
+          <a:ln w="28575">
+            <a:solidFill>
+              <a:schemeClr val="accent1"/>
+            </a:solidFill>
+          </a:ln>
+          <a:effectLst/>
+        </p:spPr>
+        <p:style>
+          <a:lnRef idx="1">
+            <a:schemeClr val="accent1"/>
+          </a:lnRef>
+          <a:fillRef idx="0">
+            <a:schemeClr val="accent1"/>
+          </a:fillRef>
+          <a:effectRef idx="0">
+            <a:schemeClr val="accent1"/>
+          </a:effectRef>
+          <a:fontRef idx="minor">
+            <a:schemeClr val="tx1"/>
+          </a:fontRef>
+        </p:style>
+      </p:cxnSp>
+      <p:pic>
+        <p:nvPicPr>
+          <p:cNvPr id="174" name="Picture 173"/>
+          <p:cNvPicPr>
+            <a:picLocks noChangeAspect="1"/>
+          </p:cNvPicPr>
+          <p:nvPr/>
+        </p:nvPicPr>
+        <p:blipFill>
+          <a:blip r:embed="rId31"/>
+          <a:stretch>
+            <a:fillRect/>
+          </a:stretch>
+        </p:blipFill>
+        <p:spPr>
+          <a:xfrm>
+            <a:off x="7955228" y="1856068"/>
+            <a:ext cx="954280" cy="134196"/>
+          </a:xfrm>
+          <a:prstGeom prst="rect">
+            <a:avLst/>
+          </a:prstGeom>
+        </p:spPr>
+      </p:pic>
+      <p:pic>
+        <p:nvPicPr>
+          <p:cNvPr id="177" name="Picture 176"/>
+          <p:cNvPicPr>
+            <a:picLocks noChangeAspect="1"/>
+          </p:cNvPicPr>
+          <p:nvPr/>
+        </p:nvPicPr>
+        <p:blipFill>
+          <a:blip r:embed="rId32"/>
+          <a:stretch>
+            <a:fillRect/>
+          </a:stretch>
+        </p:blipFill>
+        <p:spPr>
+          <a:xfrm>
+            <a:off x="7955228" y="2185606"/>
+            <a:ext cx="912949" cy="126259"/>
+          </a:xfrm>
+          <a:prstGeom prst="rect">
+            <a:avLst/>
+          </a:prstGeom>
+        </p:spPr>
+      </p:pic>
     </p:spTree>
     <p:extLst>
       <p:ext uri="{BB962C8B-B14F-4D97-AF65-F5344CB8AC3E}">

</xml_diff>